<commit_message>
Cambios en la Sprint-2
</commit_message>
<xml_diff>
--- a/Sprint-2/Demo.pptx
+++ b/Sprint-2/Demo.pptx
@@ -10017,6 +10017,129 @@
           </a:p>
         </p:txBody>
       </p:sp>
+      <p:sp>
+        <p:nvSpPr>
+          <p:cNvPr id="2" name="Google Shape;88;p16">
+            <a:extLst>
+              <a:ext uri="{FF2B5EF4-FFF2-40B4-BE49-F238E27FC236}">
+                <a16:creationId xmlns:a16="http://schemas.microsoft.com/office/drawing/2014/main" id="{79C44EBC-BE12-1FBA-3587-2788EE417B0A}"/>
+              </a:ext>
+            </a:extLst>
+          </p:cNvPr>
+          <p:cNvSpPr txBox="1">
+            <a:spLocks noGrp="1"/>
+          </p:cNvSpPr>
+          <p:nvPr>
+            <p:ph type="dt" idx="10"/>
+          </p:nvPr>
+        </p:nvSpPr>
+        <p:spPr>
+          <a:xfrm>
+            <a:off x="628650" y="4732638"/>
+            <a:ext cx="2057400" cy="273900"/>
+          </a:xfrm>
+          <a:prstGeom prst="rect">
+            <a:avLst/>
+          </a:prstGeom>
+          <a:noFill/>
+          <a:ln>
+            <a:noFill/>
+          </a:ln>
+        </p:spPr>
+        <p:txBody>
+          <a:bodyPr spcFirstLastPara="1" wrap="square" lIns="91425" tIns="45700" rIns="91425" bIns="45700" anchor="ctr" anchorCtr="0">
+            <a:noAutofit/>
+          </a:bodyPr>
+          <a:lstStyle/>
+          <a:p>
+            <a:pPr marL="0" lvl="0" indent="0" algn="l" rtl="0">
+              <a:spcBef>
+                <a:spcPts val="0"/>
+              </a:spcBef>
+              <a:spcAft>
+                <a:spcPts val="0"/>
+              </a:spcAft>
+              <a:buNone/>
+            </a:pPr>
+            <a:r>
+              <a:rPr lang="en-GB" dirty="0">
+                <a:latin typeface="Calibri"/>
+                <a:ea typeface="Calibri"/>
+                <a:cs typeface="Calibri"/>
+                <a:sym typeface="Calibri"/>
+              </a:rPr>
+              <a:t>17/03/2023</a:t>
+            </a:r>
+            <a:endParaRPr dirty="0"/>
+          </a:p>
+        </p:txBody>
+      </p:sp>
+      <p:sp>
+        <p:nvSpPr>
+          <p:cNvPr id="5" name="Google Shape;89;p16">
+            <a:extLst>
+              <a:ext uri="{FF2B5EF4-FFF2-40B4-BE49-F238E27FC236}">
+                <a16:creationId xmlns:a16="http://schemas.microsoft.com/office/drawing/2014/main" id="{3624C7AC-175C-B13D-1D30-A64A74CC1F7A}"/>
+              </a:ext>
+            </a:extLst>
+          </p:cNvPr>
+          <p:cNvSpPr txBox="1">
+            <a:spLocks noGrp="1"/>
+          </p:cNvSpPr>
+          <p:nvPr>
+            <p:ph type="ftr" idx="11"/>
+          </p:nvPr>
+        </p:nvSpPr>
+        <p:spPr>
+          <a:xfrm>
+            <a:off x="3028950" y="4767263"/>
+            <a:ext cx="3086100" cy="273900"/>
+          </a:xfrm>
+          <a:prstGeom prst="rect">
+            <a:avLst/>
+          </a:prstGeom>
+          <a:noFill/>
+          <a:ln>
+            <a:noFill/>
+          </a:ln>
+        </p:spPr>
+        <p:txBody>
+          <a:bodyPr spcFirstLastPara="1" wrap="square" lIns="91425" tIns="45700" rIns="91425" bIns="45700" anchor="ctr" anchorCtr="0">
+            <a:noAutofit/>
+          </a:bodyPr>
+          <a:lstStyle/>
+          <a:p>
+            <a:pPr marL="0" lvl="0" indent="0" algn="ctr" rtl="0">
+              <a:spcBef>
+                <a:spcPts val="0"/>
+              </a:spcBef>
+              <a:spcAft>
+                <a:spcPts val="0"/>
+              </a:spcAft>
+              <a:buNone/>
+            </a:pPr>
+            <a:r>
+              <a:rPr lang="en-GB" dirty="0" err="1">
+                <a:latin typeface="Calibri"/>
+                <a:ea typeface="Calibri"/>
+                <a:cs typeface="Calibri"/>
+                <a:sym typeface="Calibri"/>
+              </a:rPr>
+              <a:t>Consultora</a:t>
+            </a:r>
+            <a:r>
+              <a:rPr lang="en-GB" dirty="0">
+                <a:latin typeface="Calibri"/>
+                <a:ea typeface="Calibri"/>
+                <a:cs typeface="Calibri"/>
+                <a:sym typeface="Calibri"/>
+              </a:rPr>
+              <a:t>: COVENAR</a:t>
+            </a:r>
+            <a:endParaRPr dirty="0"/>
+          </a:p>
+        </p:txBody>
+      </p:sp>
     </p:spTree>
     <p:extLst>
       <p:ext uri="{BB962C8B-B14F-4D97-AF65-F5344CB8AC3E}">
@@ -10133,6 +10256,129 @@
           </a:prstGeom>
         </p:spPr>
       </p:pic>
+      <p:sp>
+        <p:nvSpPr>
+          <p:cNvPr id="2" name="Google Shape;88;p16">
+            <a:extLst>
+              <a:ext uri="{FF2B5EF4-FFF2-40B4-BE49-F238E27FC236}">
+                <a16:creationId xmlns:a16="http://schemas.microsoft.com/office/drawing/2014/main" id="{1B1CAFF5-6338-E39F-28EE-63A93E0DA9C2}"/>
+              </a:ext>
+            </a:extLst>
+          </p:cNvPr>
+          <p:cNvSpPr txBox="1">
+            <a:spLocks noGrp="1"/>
+          </p:cNvSpPr>
+          <p:nvPr>
+            <p:ph type="dt" idx="10"/>
+          </p:nvPr>
+        </p:nvSpPr>
+        <p:spPr>
+          <a:xfrm>
+            <a:off x="628650" y="4732638"/>
+            <a:ext cx="2057400" cy="273900"/>
+          </a:xfrm>
+          <a:prstGeom prst="rect">
+            <a:avLst/>
+          </a:prstGeom>
+          <a:noFill/>
+          <a:ln>
+            <a:noFill/>
+          </a:ln>
+        </p:spPr>
+        <p:txBody>
+          <a:bodyPr spcFirstLastPara="1" wrap="square" lIns="91425" tIns="45700" rIns="91425" bIns="45700" anchor="ctr" anchorCtr="0">
+            <a:noAutofit/>
+          </a:bodyPr>
+          <a:lstStyle/>
+          <a:p>
+            <a:pPr marL="0" lvl="0" indent="0" algn="l" rtl="0">
+              <a:spcBef>
+                <a:spcPts val="0"/>
+              </a:spcBef>
+              <a:spcAft>
+                <a:spcPts val="0"/>
+              </a:spcAft>
+              <a:buNone/>
+            </a:pPr>
+            <a:r>
+              <a:rPr lang="en-GB" dirty="0">
+                <a:latin typeface="Calibri"/>
+                <a:ea typeface="Calibri"/>
+                <a:cs typeface="Calibri"/>
+                <a:sym typeface="Calibri"/>
+              </a:rPr>
+              <a:t>17/03/2023</a:t>
+            </a:r>
+            <a:endParaRPr dirty="0"/>
+          </a:p>
+        </p:txBody>
+      </p:sp>
+      <p:sp>
+        <p:nvSpPr>
+          <p:cNvPr id="5" name="Google Shape;89;p16">
+            <a:extLst>
+              <a:ext uri="{FF2B5EF4-FFF2-40B4-BE49-F238E27FC236}">
+                <a16:creationId xmlns:a16="http://schemas.microsoft.com/office/drawing/2014/main" id="{FA05B073-4457-1D83-BB14-57433FDC5DD6}"/>
+              </a:ext>
+            </a:extLst>
+          </p:cNvPr>
+          <p:cNvSpPr txBox="1">
+            <a:spLocks noGrp="1"/>
+          </p:cNvSpPr>
+          <p:nvPr>
+            <p:ph type="ftr" idx="11"/>
+          </p:nvPr>
+        </p:nvSpPr>
+        <p:spPr>
+          <a:xfrm>
+            <a:off x="3028950" y="4767263"/>
+            <a:ext cx="3086100" cy="273900"/>
+          </a:xfrm>
+          <a:prstGeom prst="rect">
+            <a:avLst/>
+          </a:prstGeom>
+          <a:noFill/>
+          <a:ln>
+            <a:noFill/>
+          </a:ln>
+        </p:spPr>
+        <p:txBody>
+          <a:bodyPr spcFirstLastPara="1" wrap="square" lIns="91425" tIns="45700" rIns="91425" bIns="45700" anchor="ctr" anchorCtr="0">
+            <a:noAutofit/>
+          </a:bodyPr>
+          <a:lstStyle/>
+          <a:p>
+            <a:pPr marL="0" lvl="0" indent="0" algn="ctr" rtl="0">
+              <a:spcBef>
+                <a:spcPts val="0"/>
+              </a:spcBef>
+              <a:spcAft>
+                <a:spcPts val="0"/>
+              </a:spcAft>
+              <a:buNone/>
+            </a:pPr>
+            <a:r>
+              <a:rPr lang="en-GB" dirty="0" err="1">
+                <a:latin typeface="Calibri"/>
+                <a:ea typeface="Calibri"/>
+                <a:cs typeface="Calibri"/>
+                <a:sym typeface="Calibri"/>
+              </a:rPr>
+              <a:t>Consultora</a:t>
+            </a:r>
+            <a:r>
+              <a:rPr lang="en-GB" dirty="0">
+                <a:latin typeface="Calibri"/>
+                <a:ea typeface="Calibri"/>
+                <a:cs typeface="Calibri"/>
+                <a:sym typeface="Calibri"/>
+              </a:rPr>
+              <a:t>: COVENAR</a:t>
+            </a:r>
+            <a:endParaRPr dirty="0"/>
+          </a:p>
+        </p:txBody>
+      </p:sp>
     </p:spTree>
     <p:extLst>
       <p:ext uri="{BB962C8B-B14F-4D97-AF65-F5344CB8AC3E}">
@@ -10239,6 +10485,129 @@
               <a:rPr lang="es-ES" dirty="0"/>
               <a:t>UCI - COVENAR</a:t>
             </a:r>
+          </a:p>
+        </p:txBody>
+      </p:sp>
+      <p:sp>
+        <p:nvSpPr>
+          <p:cNvPr id="4" name="Google Shape;88;p16">
+            <a:extLst>
+              <a:ext uri="{FF2B5EF4-FFF2-40B4-BE49-F238E27FC236}">
+                <a16:creationId xmlns:a16="http://schemas.microsoft.com/office/drawing/2014/main" id="{0FEF78AB-E2A9-2B25-B9A8-72739091F9B2}"/>
+              </a:ext>
+            </a:extLst>
+          </p:cNvPr>
+          <p:cNvSpPr txBox="1">
+            <a:spLocks noGrp="1"/>
+          </p:cNvSpPr>
+          <p:nvPr>
+            <p:ph type="dt" idx="10"/>
+          </p:nvPr>
+        </p:nvSpPr>
+        <p:spPr>
+          <a:xfrm>
+            <a:off x="628650" y="4732638"/>
+            <a:ext cx="2057400" cy="273900"/>
+          </a:xfrm>
+          <a:prstGeom prst="rect">
+            <a:avLst/>
+          </a:prstGeom>
+          <a:noFill/>
+          <a:ln>
+            <a:noFill/>
+          </a:ln>
+        </p:spPr>
+        <p:txBody>
+          <a:bodyPr spcFirstLastPara="1" wrap="square" lIns="91425" tIns="45700" rIns="91425" bIns="45700" anchor="ctr" anchorCtr="0">
+            <a:noAutofit/>
+          </a:bodyPr>
+          <a:lstStyle/>
+          <a:p>
+            <a:pPr marL="0" lvl="0" indent="0" algn="l" rtl="0">
+              <a:spcBef>
+                <a:spcPts val="0"/>
+              </a:spcBef>
+              <a:spcAft>
+                <a:spcPts val="0"/>
+              </a:spcAft>
+              <a:buNone/>
+            </a:pPr>
+            <a:r>
+              <a:rPr lang="en-GB" dirty="0">
+                <a:latin typeface="Calibri"/>
+                <a:ea typeface="Calibri"/>
+                <a:cs typeface="Calibri"/>
+                <a:sym typeface="Calibri"/>
+              </a:rPr>
+              <a:t>17/03/2023</a:t>
+            </a:r>
+            <a:endParaRPr dirty="0"/>
+          </a:p>
+        </p:txBody>
+      </p:sp>
+      <p:sp>
+        <p:nvSpPr>
+          <p:cNvPr id="5" name="Google Shape;89;p16">
+            <a:extLst>
+              <a:ext uri="{FF2B5EF4-FFF2-40B4-BE49-F238E27FC236}">
+                <a16:creationId xmlns:a16="http://schemas.microsoft.com/office/drawing/2014/main" id="{E90419C4-9E2C-0BD7-0675-61E90304A147}"/>
+              </a:ext>
+            </a:extLst>
+          </p:cNvPr>
+          <p:cNvSpPr txBox="1">
+            <a:spLocks noGrp="1"/>
+          </p:cNvSpPr>
+          <p:nvPr>
+            <p:ph type="ftr" idx="11"/>
+          </p:nvPr>
+        </p:nvSpPr>
+        <p:spPr>
+          <a:xfrm>
+            <a:off x="3028950" y="4767263"/>
+            <a:ext cx="3086100" cy="273900"/>
+          </a:xfrm>
+          <a:prstGeom prst="rect">
+            <a:avLst/>
+          </a:prstGeom>
+          <a:noFill/>
+          <a:ln>
+            <a:noFill/>
+          </a:ln>
+        </p:spPr>
+        <p:txBody>
+          <a:bodyPr spcFirstLastPara="1" wrap="square" lIns="91425" tIns="45700" rIns="91425" bIns="45700" anchor="ctr" anchorCtr="0">
+            <a:noAutofit/>
+          </a:bodyPr>
+          <a:lstStyle/>
+          <a:p>
+            <a:pPr marL="0" lvl="0" indent="0" algn="ctr" rtl="0">
+              <a:spcBef>
+                <a:spcPts val="0"/>
+              </a:spcBef>
+              <a:spcAft>
+                <a:spcPts val="0"/>
+              </a:spcAft>
+              <a:buNone/>
+            </a:pPr>
+            <a:r>
+              <a:rPr lang="en-GB" dirty="0" err="1">
+                <a:latin typeface="Calibri"/>
+                <a:ea typeface="Calibri"/>
+                <a:cs typeface="Calibri"/>
+                <a:sym typeface="Calibri"/>
+              </a:rPr>
+              <a:t>Consultora</a:t>
+            </a:r>
+            <a:r>
+              <a:rPr lang="en-GB" dirty="0">
+                <a:latin typeface="Calibri"/>
+                <a:ea typeface="Calibri"/>
+                <a:cs typeface="Calibri"/>
+                <a:sym typeface="Calibri"/>
+              </a:rPr>
+              <a:t>: COVENAR</a:t>
+            </a:r>
+            <a:endParaRPr dirty="0"/>
           </a:p>
         </p:txBody>
       </p:sp>

</xml_diff>

<commit_message>
Se agrego el ETL correcto y se agrego el Script de la base de datos
</commit_message>
<xml_diff>
--- a/Sprint-2/Demo.pptx
+++ b/Sprint-2/Demo.pptx
@@ -10017,129 +10017,6 @@
           </a:p>
         </p:txBody>
       </p:sp>
-      <p:sp>
-        <p:nvSpPr>
-          <p:cNvPr id="2" name="Google Shape;88;p16">
-            <a:extLst>
-              <a:ext uri="{FF2B5EF4-FFF2-40B4-BE49-F238E27FC236}">
-                <a16:creationId xmlns:a16="http://schemas.microsoft.com/office/drawing/2014/main" id="{79C44EBC-BE12-1FBA-3587-2788EE417B0A}"/>
-              </a:ext>
-            </a:extLst>
-          </p:cNvPr>
-          <p:cNvSpPr txBox="1">
-            <a:spLocks noGrp="1"/>
-          </p:cNvSpPr>
-          <p:nvPr>
-            <p:ph type="dt" idx="10"/>
-          </p:nvPr>
-        </p:nvSpPr>
-        <p:spPr>
-          <a:xfrm>
-            <a:off x="628650" y="4732638"/>
-            <a:ext cx="2057400" cy="273900"/>
-          </a:xfrm>
-          <a:prstGeom prst="rect">
-            <a:avLst/>
-          </a:prstGeom>
-          <a:noFill/>
-          <a:ln>
-            <a:noFill/>
-          </a:ln>
-        </p:spPr>
-        <p:txBody>
-          <a:bodyPr spcFirstLastPara="1" wrap="square" lIns="91425" tIns="45700" rIns="91425" bIns="45700" anchor="ctr" anchorCtr="0">
-            <a:noAutofit/>
-          </a:bodyPr>
-          <a:lstStyle/>
-          <a:p>
-            <a:pPr marL="0" lvl="0" indent="0" algn="l" rtl="0">
-              <a:spcBef>
-                <a:spcPts val="0"/>
-              </a:spcBef>
-              <a:spcAft>
-                <a:spcPts val="0"/>
-              </a:spcAft>
-              <a:buNone/>
-            </a:pPr>
-            <a:r>
-              <a:rPr lang="en-GB" dirty="0">
-                <a:latin typeface="Calibri"/>
-                <a:ea typeface="Calibri"/>
-                <a:cs typeface="Calibri"/>
-                <a:sym typeface="Calibri"/>
-              </a:rPr>
-              <a:t>17/03/2023</a:t>
-            </a:r>
-            <a:endParaRPr dirty="0"/>
-          </a:p>
-        </p:txBody>
-      </p:sp>
-      <p:sp>
-        <p:nvSpPr>
-          <p:cNvPr id="5" name="Google Shape;89;p16">
-            <a:extLst>
-              <a:ext uri="{FF2B5EF4-FFF2-40B4-BE49-F238E27FC236}">
-                <a16:creationId xmlns:a16="http://schemas.microsoft.com/office/drawing/2014/main" id="{3624C7AC-175C-B13D-1D30-A64A74CC1F7A}"/>
-              </a:ext>
-            </a:extLst>
-          </p:cNvPr>
-          <p:cNvSpPr txBox="1">
-            <a:spLocks noGrp="1"/>
-          </p:cNvSpPr>
-          <p:nvPr>
-            <p:ph type="ftr" idx="11"/>
-          </p:nvPr>
-        </p:nvSpPr>
-        <p:spPr>
-          <a:xfrm>
-            <a:off x="3028950" y="4767263"/>
-            <a:ext cx="3086100" cy="273900"/>
-          </a:xfrm>
-          <a:prstGeom prst="rect">
-            <a:avLst/>
-          </a:prstGeom>
-          <a:noFill/>
-          <a:ln>
-            <a:noFill/>
-          </a:ln>
-        </p:spPr>
-        <p:txBody>
-          <a:bodyPr spcFirstLastPara="1" wrap="square" lIns="91425" tIns="45700" rIns="91425" bIns="45700" anchor="ctr" anchorCtr="0">
-            <a:noAutofit/>
-          </a:bodyPr>
-          <a:lstStyle/>
-          <a:p>
-            <a:pPr marL="0" lvl="0" indent="0" algn="ctr" rtl="0">
-              <a:spcBef>
-                <a:spcPts val="0"/>
-              </a:spcBef>
-              <a:spcAft>
-                <a:spcPts val="0"/>
-              </a:spcAft>
-              <a:buNone/>
-            </a:pPr>
-            <a:r>
-              <a:rPr lang="en-GB" dirty="0" err="1">
-                <a:latin typeface="Calibri"/>
-                <a:ea typeface="Calibri"/>
-                <a:cs typeface="Calibri"/>
-                <a:sym typeface="Calibri"/>
-              </a:rPr>
-              <a:t>Consultora</a:t>
-            </a:r>
-            <a:r>
-              <a:rPr lang="en-GB" dirty="0">
-                <a:latin typeface="Calibri"/>
-                <a:ea typeface="Calibri"/>
-                <a:cs typeface="Calibri"/>
-                <a:sym typeface="Calibri"/>
-              </a:rPr>
-              <a:t>: COVENAR</a:t>
-            </a:r>
-            <a:endParaRPr dirty="0"/>
-          </a:p>
-        </p:txBody>
-      </p:sp>
     </p:spTree>
     <p:extLst>
       <p:ext uri="{BB962C8B-B14F-4D97-AF65-F5344CB8AC3E}">
@@ -10256,129 +10133,6 @@
           </a:prstGeom>
         </p:spPr>
       </p:pic>
-      <p:sp>
-        <p:nvSpPr>
-          <p:cNvPr id="2" name="Google Shape;88;p16">
-            <a:extLst>
-              <a:ext uri="{FF2B5EF4-FFF2-40B4-BE49-F238E27FC236}">
-                <a16:creationId xmlns:a16="http://schemas.microsoft.com/office/drawing/2014/main" id="{1B1CAFF5-6338-E39F-28EE-63A93E0DA9C2}"/>
-              </a:ext>
-            </a:extLst>
-          </p:cNvPr>
-          <p:cNvSpPr txBox="1">
-            <a:spLocks noGrp="1"/>
-          </p:cNvSpPr>
-          <p:nvPr>
-            <p:ph type="dt" idx="10"/>
-          </p:nvPr>
-        </p:nvSpPr>
-        <p:spPr>
-          <a:xfrm>
-            <a:off x="628650" y="4732638"/>
-            <a:ext cx="2057400" cy="273900"/>
-          </a:xfrm>
-          <a:prstGeom prst="rect">
-            <a:avLst/>
-          </a:prstGeom>
-          <a:noFill/>
-          <a:ln>
-            <a:noFill/>
-          </a:ln>
-        </p:spPr>
-        <p:txBody>
-          <a:bodyPr spcFirstLastPara="1" wrap="square" lIns="91425" tIns="45700" rIns="91425" bIns="45700" anchor="ctr" anchorCtr="0">
-            <a:noAutofit/>
-          </a:bodyPr>
-          <a:lstStyle/>
-          <a:p>
-            <a:pPr marL="0" lvl="0" indent="0" algn="l" rtl="0">
-              <a:spcBef>
-                <a:spcPts val="0"/>
-              </a:spcBef>
-              <a:spcAft>
-                <a:spcPts val="0"/>
-              </a:spcAft>
-              <a:buNone/>
-            </a:pPr>
-            <a:r>
-              <a:rPr lang="en-GB" dirty="0">
-                <a:latin typeface="Calibri"/>
-                <a:ea typeface="Calibri"/>
-                <a:cs typeface="Calibri"/>
-                <a:sym typeface="Calibri"/>
-              </a:rPr>
-              <a:t>17/03/2023</a:t>
-            </a:r>
-            <a:endParaRPr dirty="0"/>
-          </a:p>
-        </p:txBody>
-      </p:sp>
-      <p:sp>
-        <p:nvSpPr>
-          <p:cNvPr id="5" name="Google Shape;89;p16">
-            <a:extLst>
-              <a:ext uri="{FF2B5EF4-FFF2-40B4-BE49-F238E27FC236}">
-                <a16:creationId xmlns:a16="http://schemas.microsoft.com/office/drawing/2014/main" id="{FA05B073-4457-1D83-BB14-57433FDC5DD6}"/>
-              </a:ext>
-            </a:extLst>
-          </p:cNvPr>
-          <p:cNvSpPr txBox="1">
-            <a:spLocks noGrp="1"/>
-          </p:cNvSpPr>
-          <p:nvPr>
-            <p:ph type="ftr" idx="11"/>
-          </p:nvPr>
-        </p:nvSpPr>
-        <p:spPr>
-          <a:xfrm>
-            <a:off x="3028950" y="4767263"/>
-            <a:ext cx="3086100" cy="273900"/>
-          </a:xfrm>
-          <a:prstGeom prst="rect">
-            <a:avLst/>
-          </a:prstGeom>
-          <a:noFill/>
-          <a:ln>
-            <a:noFill/>
-          </a:ln>
-        </p:spPr>
-        <p:txBody>
-          <a:bodyPr spcFirstLastPara="1" wrap="square" lIns="91425" tIns="45700" rIns="91425" bIns="45700" anchor="ctr" anchorCtr="0">
-            <a:noAutofit/>
-          </a:bodyPr>
-          <a:lstStyle/>
-          <a:p>
-            <a:pPr marL="0" lvl="0" indent="0" algn="ctr" rtl="0">
-              <a:spcBef>
-                <a:spcPts val="0"/>
-              </a:spcBef>
-              <a:spcAft>
-                <a:spcPts val="0"/>
-              </a:spcAft>
-              <a:buNone/>
-            </a:pPr>
-            <a:r>
-              <a:rPr lang="en-GB" dirty="0" err="1">
-                <a:latin typeface="Calibri"/>
-                <a:ea typeface="Calibri"/>
-                <a:cs typeface="Calibri"/>
-                <a:sym typeface="Calibri"/>
-              </a:rPr>
-              <a:t>Consultora</a:t>
-            </a:r>
-            <a:r>
-              <a:rPr lang="en-GB" dirty="0">
-                <a:latin typeface="Calibri"/>
-                <a:ea typeface="Calibri"/>
-                <a:cs typeface="Calibri"/>
-                <a:sym typeface="Calibri"/>
-              </a:rPr>
-              <a:t>: COVENAR</a:t>
-            </a:r>
-            <a:endParaRPr dirty="0"/>
-          </a:p>
-        </p:txBody>
-      </p:sp>
     </p:spTree>
     <p:extLst>
       <p:ext uri="{BB962C8B-B14F-4D97-AF65-F5344CB8AC3E}">
@@ -10485,129 +10239,6 @@
               <a:rPr lang="es-ES" dirty="0"/>
               <a:t>UCI - COVENAR</a:t>
             </a:r>
-          </a:p>
-        </p:txBody>
-      </p:sp>
-      <p:sp>
-        <p:nvSpPr>
-          <p:cNvPr id="4" name="Google Shape;88;p16">
-            <a:extLst>
-              <a:ext uri="{FF2B5EF4-FFF2-40B4-BE49-F238E27FC236}">
-                <a16:creationId xmlns:a16="http://schemas.microsoft.com/office/drawing/2014/main" id="{0FEF78AB-E2A9-2B25-B9A8-72739091F9B2}"/>
-              </a:ext>
-            </a:extLst>
-          </p:cNvPr>
-          <p:cNvSpPr txBox="1">
-            <a:spLocks noGrp="1"/>
-          </p:cNvSpPr>
-          <p:nvPr>
-            <p:ph type="dt" idx="10"/>
-          </p:nvPr>
-        </p:nvSpPr>
-        <p:spPr>
-          <a:xfrm>
-            <a:off x="628650" y="4732638"/>
-            <a:ext cx="2057400" cy="273900"/>
-          </a:xfrm>
-          <a:prstGeom prst="rect">
-            <a:avLst/>
-          </a:prstGeom>
-          <a:noFill/>
-          <a:ln>
-            <a:noFill/>
-          </a:ln>
-        </p:spPr>
-        <p:txBody>
-          <a:bodyPr spcFirstLastPara="1" wrap="square" lIns="91425" tIns="45700" rIns="91425" bIns="45700" anchor="ctr" anchorCtr="0">
-            <a:noAutofit/>
-          </a:bodyPr>
-          <a:lstStyle/>
-          <a:p>
-            <a:pPr marL="0" lvl="0" indent="0" algn="l" rtl="0">
-              <a:spcBef>
-                <a:spcPts val="0"/>
-              </a:spcBef>
-              <a:spcAft>
-                <a:spcPts val="0"/>
-              </a:spcAft>
-              <a:buNone/>
-            </a:pPr>
-            <a:r>
-              <a:rPr lang="en-GB" dirty="0">
-                <a:latin typeface="Calibri"/>
-                <a:ea typeface="Calibri"/>
-                <a:cs typeface="Calibri"/>
-                <a:sym typeface="Calibri"/>
-              </a:rPr>
-              <a:t>17/03/2023</a:t>
-            </a:r>
-            <a:endParaRPr dirty="0"/>
-          </a:p>
-        </p:txBody>
-      </p:sp>
-      <p:sp>
-        <p:nvSpPr>
-          <p:cNvPr id="5" name="Google Shape;89;p16">
-            <a:extLst>
-              <a:ext uri="{FF2B5EF4-FFF2-40B4-BE49-F238E27FC236}">
-                <a16:creationId xmlns:a16="http://schemas.microsoft.com/office/drawing/2014/main" id="{E90419C4-9E2C-0BD7-0675-61E90304A147}"/>
-              </a:ext>
-            </a:extLst>
-          </p:cNvPr>
-          <p:cNvSpPr txBox="1">
-            <a:spLocks noGrp="1"/>
-          </p:cNvSpPr>
-          <p:nvPr>
-            <p:ph type="ftr" idx="11"/>
-          </p:nvPr>
-        </p:nvSpPr>
-        <p:spPr>
-          <a:xfrm>
-            <a:off x="3028950" y="4767263"/>
-            <a:ext cx="3086100" cy="273900"/>
-          </a:xfrm>
-          <a:prstGeom prst="rect">
-            <a:avLst/>
-          </a:prstGeom>
-          <a:noFill/>
-          <a:ln>
-            <a:noFill/>
-          </a:ln>
-        </p:spPr>
-        <p:txBody>
-          <a:bodyPr spcFirstLastPara="1" wrap="square" lIns="91425" tIns="45700" rIns="91425" bIns="45700" anchor="ctr" anchorCtr="0">
-            <a:noAutofit/>
-          </a:bodyPr>
-          <a:lstStyle/>
-          <a:p>
-            <a:pPr marL="0" lvl="0" indent="0" algn="ctr" rtl="0">
-              <a:spcBef>
-                <a:spcPts val="0"/>
-              </a:spcBef>
-              <a:spcAft>
-                <a:spcPts val="0"/>
-              </a:spcAft>
-              <a:buNone/>
-            </a:pPr>
-            <a:r>
-              <a:rPr lang="en-GB" dirty="0" err="1">
-                <a:latin typeface="Calibri"/>
-                <a:ea typeface="Calibri"/>
-                <a:cs typeface="Calibri"/>
-                <a:sym typeface="Calibri"/>
-              </a:rPr>
-              <a:t>Consultora</a:t>
-            </a:r>
-            <a:r>
-              <a:rPr lang="en-GB" dirty="0">
-                <a:latin typeface="Calibri"/>
-                <a:ea typeface="Calibri"/>
-                <a:cs typeface="Calibri"/>
-                <a:sym typeface="Calibri"/>
-              </a:rPr>
-              <a:t>: COVENAR</a:t>
-            </a:r>
-            <a:endParaRPr dirty="0"/>
           </a:p>
         </p:txBody>
       </p:sp>

</xml_diff>